<commit_message>
Replaced uccs structure diagram
</commit_message>
<xml_diff>
--- a/OpenSHMEM-UCCS.pptx
+++ b/OpenSHMEM-UCCS.pptx
@@ -20725,25 +20725,8 @@
                 <a:ea typeface="新細明體" pitchFamily="-110" charset="-120"/>
                 <a:cs typeface="新細明體" pitchFamily="-110" charset="-120"/>
               </a:rPr>
-              <a:t>Presenters:  Aaron </a:t>
-            </a:r>
-            <a:r>
-              <a:rPr lang="en-US" altLang="zh-TW" sz="2000" dirty="0" smtClean="0">
-                <a:solidFill>
-                  <a:srgbClr val="FFFFFF"/>
-                </a:solidFill>
-                <a:ea typeface="新細明體" pitchFamily="-110" charset="-120"/>
-                <a:cs typeface="新細明體" pitchFamily="-110" charset="-120"/>
-              </a:rPr>
-              <a:t>Welch, Pavel Shamis, Steve Poole</a:t>
-            </a:r>
-            <a:endParaRPr lang="en-US" altLang="zh-TW" sz="2000" dirty="0" smtClean="0">
-              <a:solidFill>
-                <a:srgbClr val="FFFFFF"/>
-              </a:solidFill>
-              <a:ea typeface="新細明體" pitchFamily="-110" charset="-120"/>
-              <a:cs typeface="新細明體" pitchFamily="-110" charset="-120"/>
-            </a:endParaRPr>
+              <a:t>Presenters:  Aaron Welch, Pavel Shamis, Steve Poole</a:t>
+            </a:r>
           </a:p>
           <a:p>
             <a:pPr algn="r" eaLnBrk="1" hangingPunct="1"/>
@@ -32917,9 +32900,9 @@
       </p:sp>
       <p:pic>
         <p:nvPicPr>
-          <p:cNvPr id="4104" name="Picture 8"/>
+          <p:cNvPr id="3" name="Picture 2" descr="project_layout.pdf"/>
           <p:cNvPicPr>
-            <a:picLocks noChangeAspect="1" noChangeArrowheads="1"/>
+            <a:picLocks noChangeAspect="1"/>
           </p:cNvPicPr>
           <p:nvPr/>
         </p:nvPicPr>
@@ -32931,58 +32914,18 @@
               </a:ext>
             </a:extLst>
           </a:blip>
-          <a:srcRect/>
           <a:stretch>
             <a:fillRect/>
           </a:stretch>
         </p:blipFill>
-        <p:spPr bwMode="auto">
+        <p:spPr>
           <a:xfrm>
-            <a:off x="1295400" y="3847325"/>
-            <a:ext cx="6553919" cy="2553475"/>
+            <a:off x="-25916" y="3352800"/>
+            <a:ext cx="9144000" cy="2653990"/>
           </a:xfrm>
           <a:prstGeom prst="rect">
             <a:avLst/>
           </a:prstGeom>
-          <a:noFill/>
-          <a:ln>
-            <a:noFill/>
-          </a:ln>
-          <a:effectLst/>
-          <a:extLst>
-            <a:ext uri="{909E8E84-426E-40dd-AFC4-6F175D3DCCD1}">
-              <a14:hiddenFill xmlns:a14="http://schemas.microsoft.com/office/drawing/2010/main">
-                <a:blipFill dpi="0" rotWithShape="0">
-                  <a:blip/>
-                  <a:srcRect/>
-                  <a:stretch>
-                    <a:fillRect/>
-                  </a:stretch>
-                </a:blipFill>
-              </a14:hiddenFill>
-            </a:ext>
-            <a:ext uri="{91240B29-F687-4f45-9708-019B960494DF}">
-              <a14:hiddenLine xmlns:a14="http://schemas.microsoft.com/office/drawing/2010/main" w="9525">
-                <a:solidFill>
-                  <a:srgbClr val="808080"/>
-                </a:solidFill>
-                <a:round/>
-                <a:headEnd/>
-                <a:tailEnd/>
-              </a14:hiddenLine>
-            </a:ext>
-            <a:ext uri="{AF507438-7753-43e0-B8FC-AC1667EBCBE1}">
-              <a14:hiddenEffects xmlns:a14="http://schemas.microsoft.com/office/drawing/2010/main">
-                <a:effectLst>
-                  <a:outerShdw blurRad="63500" dist="38099" dir="2700000" algn="ctr" rotWithShape="0">
-                    <a:srgbClr val="000000">
-                      <a:alpha val="74998"/>
-                    </a:srgbClr>
-                  </a:outerShdw>
-                </a:effectLst>
-              </a14:hiddenEffects>
-            </a:ext>
-          </a:extLst>
         </p:spPr>
       </p:pic>
     </p:spTree>

</xml_diff>